<commit_message>
Hide Problem Set 22 slides.
</commit_message>
<xml_diff>
--- a/Tutorial_8/CS1010_TutC09_8.pptx
+++ b/Tutorial_8/CS1010_TutC09_8.pptx
@@ -15851,7 +15851,7 @@
 </file>
 
 <file path=ppt/slides/slide32.xml><?xml version="1.0" encoding="utf-8"?>
-<p:sld xmlns:a="http://schemas.openxmlformats.org/drawingml/2006/main" xmlns:r="http://schemas.openxmlformats.org/officeDocument/2006/relationships" xmlns:p="http://schemas.openxmlformats.org/presentationml/2006/main">
+<p:sld xmlns:a="http://schemas.openxmlformats.org/drawingml/2006/main" xmlns:r="http://schemas.openxmlformats.org/officeDocument/2006/relationships" xmlns:p="http://schemas.openxmlformats.org/presentationml/2006/main" show="0">
   <p:cSld>
     <p:spTree>
       <p:nvGrpSpPr>
@@ -16031,14 +16031,6 @@
             <a:r>
               <a:rPr lang="en-US" sz="4000" b="1" dirty="0">
                 <a:solidFill>
-                  <a:schemeClr val="tx1"/>
-                </a:solidFill>
-              </a:rPr>
-              <a:t>Recap. </a:t>
-            </a:r>
-            <a:r>
-              <a:rPr lang="en-US" sz="4000" b="1" dirty="0">
-                <a:solidFill>
                   <a:srgbClr val="0070C0"/>
                 </a:solidFill>
               </a:rPr>
@@ -16074,7 +16066,7 @@
 </file>
 
 <file path=ppt/slides/slide33.xml><?xml version="1.0" encoding="utf-8"?>
-<p:sld xmlns:a="http://schemas.openxmlformats.org/drawingml/2006/main" xmlns:r="http://schemas.openxmlformats.org/officeDocument/2006/relationships" xmlns:p="http://schemas.openxmlformats.org/presentationml/2006/main">
+<p:sld xmlns:a="http://schemas.openxmlformats.org/drawingml/2006/main" xmlns:r="http://schemas.openxmlformats.org/officeDocument/2006/relationships" xmlns:p="http://schemas.openxmlformats.org/presentationml/2006/main" show="0">
   <p:cSld>
     <p:spTree>
       <p:nvGrpSpPr>
@@ -16233,7 +16225,7 @@
 </file>
 
 <file path=ppt/slides/slide34.xml><?xml version="1.0" encoding="utf-8"?>
-<p:sld xmlns:a="http://schemas.openxmlformats.org/drawingml/2006/main" xmlns:r="http://schemas.openxmlformats.org/officeDocument/2006/relationships" xmlns:p="http://schemas.openxmlformats.org/presentationml/2006/main">
+<p:sld xmlns:a="http://schemas.openxmlformats.org/drawingml/2006/main" xmlns:r="http://schemas.openxmlformats.org/officeDocument/2006/relationships" xmlns:p="http://schemas.openxmlformats.org/presentationml/2006/main" show="0">
   <p:cSld>
     <p:spTree>
       <p:nvGrpSpPr>
@@ -16448,7 +16440,7 @@
 </file>
 
 <file path=ppt/slides/slide35.xml><?xml version="1.0" encoding="utf-8"?>
-<p:sld xmlns:a="http://schemas.openxmlformats.org/drawingml/2006/main" xmlns:r="http://schemas.openxmlformats.org/officeDocument/2006/relationships" xmlns:p="http://schemas.openxmlformats.org/presentationml/2006/main">
+<p:sld xmlns:a="http://schemas.openxmlformats.org/drawingml/2006/main" xmlns:r="http://schemas.openxmlformats.org/officeDocument/2006/relationships" xmlns:p="http://schemas.openxmlformats.org/presentationml/2006/main" show="0">
   <p:cSld>
     <p:spTree>
       <p:nvGrpSpPr>
@@ -16663,7 +16655,7 @@
 </file>
 
 <file path=ppt/slides/slide36.xml><?xml version="1.0" encoding="utf-8"?>
-<p:sld xmlns:a="http://schemas.openxmlformats.org/drawingml/2006/main" xmlns:r="http://schemas.openxmlformats.org/officeDocument/2006/relationships" xmlns:p="http://schemas.openxmlformats.org/presentationml/2006/main">
+<p:sld xmlns:a="http://schemas.openxmlformats.org/drawingml/2006/main" xmlns:r="http://schemas.openxmlformats.org/officeDocument/2006/relationships" xmlns:p="http://schemas.openxmlformats.org/presentationml/2006/main" show="0">
   <p:cSld>
     <p:spTree>
       <p:nvGrpSpPr>
@@ -16888,7 +16880,7 @@
 </file>
 
 <file path=ppt/slides/slide37.xml><?xml version="1.0" encoding="utf-8"?>
-<p:sld xmlns:a="http://schemas.openxmlformats.org/drawingml/2006/main" xmlns:r="http://schemas.openxmlformats.org/officeDocument/2006/relationships" xmlns:p="http://schemas.openxmlformats.org/presentationml/2006/main">
+<p:sld xmlns:a="http://schemas.openxmlformats.org/drawingml/2006/main" xmlns:r="http://schemas.openxmlformats.org/officeDocument/2006/relationships" xmlns:p="http://schemas.openxmlformats.org/presentationml/2006/main" show="0">
   <p:cSld>
     <p:spTree>
       <p:nvGrpSpPr>
@@ -17110,7 +17102,7 @@
 </file>
 
 <file path=ppt/slides/slide38.xml><?xml version="1.0" encoding="utf-8"?>
-<p:sld xmlns:a="http://schemas.openxmlformats.org/drawingml/2006/main" xmlns:r="http://schemas.openxmlformats.org/officeDocument/2006/relationships" xmlns:p="http://schemas.openxmlformats.org/presentationml/2006/main">
+<p:sld xmlns:a="http://schemas.openxmlformats.org/drawingml/2006/main" xmlns:r="http://schemas.openxmlformats.org/officeDocument/2006/relationships" xmlns:p="http://schemas.openxmlformats.org/presentationml/2006/main" show="0">
   <p:cSld>
     <p:spTree>
       <p:nvGrpSpPr>
@@ -17351,7 +17343,7 @@
 </file>
 
 <file path=ppt/slides/slide39.xml><?xml version="1.0" encoding="utf-8"?>
-<p:sld xmlns:a="http://schemas.openxmlformats.org/drawingml/2006/main" xmlns:r="http://schemas.openxmlformats.org/officeDocument/2006/relationships" xmlns:p="http://schemas.openxmlformats.org/presentationml/2006/main">
+<p:sld xmlns:a="http://schemas.openxmlformats.org/drawingml/2006/main" xmlns:r="http://schemas.openxmlformats.org/officeDocument/2006/relationships" xmlns:p="http://schemas.openxmlformats.org/presentationml/2006/main" show="0">
   <p:cSld>
     <p:spTree>
       <p:nvGrpSpPr>
@@ -17774,7 +17766,7 @@
 </file>
 
 <file path=ppt/slides/slide40.xml><?xml version="1.0" encoding="utf-8"?>
-<p:sld xmlns:a="http://schemas.openxmlformats.org/drawingml/2006/main" xmlns:r="http://schemas.openxmlformats.org/officeDocument/2006/relationships" xmlns:p="http://schemas.openxmlformats.org/presentationml/2006/main">
+<p:sld xmlns:a="http://schemas.openxmlformats.org/drawingml/2006/main" xmlns:r="http://schemas.openxmlformats.org/officeDocument/2006/relationships" xmlns:p="http://schemas.openxmlformats.org/presentationml/2006/main" show="0">
   <p:cSld>
     <p:spTree>
       <p:nvGrpSpPr>

</xml_diff>

<commit_message>
Update on slides tutorial 8
</commit_message>
<xml_diff>
--- a/Tutorial_8/CS1010_TutC09_8.pptx
+++ b/Tutorial_8/CS1010_TutC09_8.pptx
@@ -2491,6 +2491,141 @@
           <a:bodyPr/>
           <a:lstStyle/>
           <a:p>
+            <a:pPr marL="0" marR="0" lvl="0" indent="0" algn="l" defTabSz="914400" rtl="0" eaLnBrk="1" fontAlgn="auto" latinLnBrk="0" hangingPunct="1">
+              <a:lnSpc>
+                <a:spcPct val="100000"/>
+              </a:lnSpc>
+              <a:spcBef>
+                <a:spcPts val="0"/>
+              </a:spcBef>
+              <a:spcAft>
+                <a:spcPts val="0"/>
+              </a:spcAft>
+              <a:buClrTx/>
+              <a:buSzTx/>
+              <a:buFontTx/>
+              <a:buNone/>
+              <a:tabLst/>
+              <a:defRPr/>
+            </a:pPr>
+            <a:r>
+              <a:rPr lang="pt-BR" b="0" dirty="0">
+                <a:solidFill>
+                  <a:srgbClr val="00B050"/>
+                </a:solidFill>
+              </a:rPr>
+              <a:t>For 1. the tie is because: </a:t>
+            </a:r>
+          </a:p>
+          <a:p>
+            <a:pPr marL="0" marR="0" lvl="0" indent="0" algn="l" defTabSz="914400" rtl="0" eaLnBrk="1" fontAlgn="auto" latinLnBrk="0" hangingPunct="1">
+              <a:lnSpc>
+                <a:spcPct val="100000"/>
+              </a:lnSpc>
+              <a:spcBef>
+                <a:spcPts val="0"/>
+              </a:spcBef>
+              <a:spcAft>
+                <a:spcPts val="0"/>
+              </a:spcAft>
+              <a:buClrTx/>
+              <a:buSzTx/>
+              <a:buFontTx/>
+              <a:buNone/>
+              <a:tabLst/>
+              <a:defRPr/>
+            </a:pPr>
+            <a:r>
+              <a:rPr lang="pt-BR" b="1" dirty="0">
+                <a:solidFill>
+                  <a:srgbClr val="00B050"/>
+                </a:solidFill>
+              </a:rPr>
+              <a:t>Log</a:t>
+            </a:r>
+            <a:r>
+              <a:rPr lang="pt-BR" sz="1000" b="1" dirty="0">
+                <a:solidFill>
+                  <a:srgbClr val="00B050"/>
+                </a:solidFill>
+              </a:rPr>
+              <a:t>10 </a:t>
+            </a:r>
+            <a:r>
+              <a:rPr lang="pt-BR" b="1" dirty="0">
+                <a:solidFill>
+                  <a:srgbClr val="00B050"/>
+                </a:solidFill>
+              </a:rPr>
+              <a:t>n </a:t>
+            </a:r>
+            <a:r>
+              <a:rPr lang="en-US" dirty="0"/>
+              <a:t>should have the same rate as </a:t>
+            </a:r>
+            <a:r>
+              <a:rPr lang="pt-BR" b="1" dirty="0">
+                <a:solidFill>
+                  <a:srgbClr val="00B050"/>
+                </a:solidFill>
+              </a:rPr>
+              <a:t>ln n, </a:t>
+            </a:r>
+            <a:r>
+              <a:rPr lang="en-US" dirty="0"/>
+              <a:t>we can convert them into the same based by a multiplicative constant.</a:t>
+            </a:r>
+          </a:p>
+          <a:p>
+            <a:r>
+              <a:rPr lang="en-US" dirty="0" err="1"/>
+              <a:t>logb</a:t>
+            </a:r>
+            <a:r>
+              <a:rPr lang="en-US" dirty="0"/>
+              <a:t>(x) = </a:t>
+            </a:r>
+            <a:r>
+              <a:rPr lang="en-US" dirty="0" err="1"/>
+              <a:t>logd</a:t>
+            </a:r>
+            <a:r>
+              <a:rPr lang="en-US" dirty="0"/>
+              <a:t>(x) / </a:t>
+            </a:r>
+            <a:r>
+              <a:rPr lang="en-US" dirty="0" err="1"/>
+              <a:t>logd</a:t>
+            </a:r>
+            <a:r>
+              <a:rPr lang="en-US" dirty="0"/>
+              <a:t>(b)</a:t>
+            </a:r>
+          </a:p>
+          <a:p>
+            <a:endParaRPr lang="en-US" dirty="0"/>
+          </a:p>
+          <a:p>
+            <a:r>
+              <a:rPr lang="en-US" dirty="0"/>
+              <a:t>For 7., 8. and 9., it is like this because:</a:t>
+            </a:r>
+          </a:p>
+          <a:p>
+            <a:r>
+              <a:rPr lang="en-US" dirty="0"/>
+              <a:t>The expression </a:t>
+            </a:r>
+            <a:r>
+              <a:rPr lang="en-US" dirty="0" err="1"/>
+              <a:t>c^n</a:t>
+            </a:r>
+            <a:r>
+              <a:rPr lang="en-US" dirty="0"/>
+              <a:t> is smaller than n! for any constant c, since we are multiplying c with itself n times, while for n! we are multiplying numbers with increasing value 1 * 2 * 3 * 4..* n.</a:t>
+            </a:r>
+          </a:p>
+          <a:p>
             <a:endParaRPr lang="en-SG" dirty="0"/>
           </a:p>
         </p:txBody>
@@ -2743,6 +2878,10 @@
           <a:bodyPr/>
           <a:lstStyle/>
           <a:p>
+            <a:r>
+              <a:rPr lang="en-US" dirty="0"/>
+              <a:t>There are two for loops, inner one takes O(n/2) = O(n) times, outer one O(n) times, so in total O(n^2) times.</a:t>
+            </a:r>
             <a:endParaRPr lang="en-SG" dirty="0"/>
           </a:p>
         </p:txBody>
@@ -2911,6 +3050,30 @@
           <a:bodyPr/>
           <a:lstStyle/>
           <a:p>
+            <a:pPr marL="0" marR="0" lvl="0" indent="0" algn="l" defTabSz="914400" rtl="0" eaLnBrk="1" fontAlgn="auto" latinLnBrk="0" hangingPunct="1">
+              <a:lnSpc>
+                <a:spcPct val="100000"/>
+              </a:lnSpc>
+              <a:spcBef>
+                <a:spcPts val="0"/>
+              </a:spcBef>
+              <a:spcAft>
+                <a:spcPts val="0"/>
+              </a:spcAft>
+              <a:buClrTx/>
+              <a:buSzTx/>
+              <a:buFontTx/>
+              <a:buNone/>
+              <a:tabLst/>
+              <a:defRPr/>
+            </a:pPr>
+            <a:r>
+              <a:rPr lang="en-US" dirty="0"/>
+              <a:t>The inner loop takes O(log n) times, output loop takes O(log n) times, so in total O(log^2 n) times.</a:t>
+            </a:r>
+            <a:endParaRPr lang="en-SG" dirty="0"/>
+          </a:p>
+          <a:p>
             <a:endParaRPr lang="en-SG" dirty="0"/>
           </a:p>
         </p:txBody>
@@ -3079,6 +3242,10 @@
           <a:bodyPr/>
           <a:lstStyle/>
           <a:p>
+            <a:r>
+              <a:rPr lang="en-US" dirty="0"/>
+              <a:t>When j = 0, the inner loop loops 2 times. When j = 1, the inner loop loops 4 times, then j = 2, 8 times, etc. So the inner loop loops 2^j times. Total running time is 2 + 4 + 8 + .. 2^n times = O(2^(n+1)) = O(2^n).</a:t>
+            </a:r>
             <a:endParaRPr lang="en-SG" dirty="0"/>
           </a:p>
         </p:txBody>
@@ -16148,16 +16315,28 @@
               <a:buNone/>
             </a:pPr>
             <a:r>
-              <a:rPr lang="pt-BR" dirty="0"/>
+              <a:rPr lang="pt-BR" b="1" dirty="0">
+                <a:solidFill>
+                  <a:srgbClr val="00B050"/>
+                </a:solidFill>
+              </a:rPr>
               <a:t>1. Log</a:t>
             </a:r>
             <a:r>
-              <a:rPr lang="pt-BR" sz="1800" dirty="0"/>
+              <a:rPr lang="pt-BR" sz="1800" b="1" dirty="0">
+                <a:solidFill>
+                  <a:srgbClr val="00B050"/>
+                </a:solidFill>
+              </a:rPr>
               <a:t>10 </a:t>
             </a:r>
             <a:r>
-              <a:rPr lang="pt-BR" dirty="0"/>
-              <a:t>n		2. ln n</a:t>
+              <a:rPr lang="pt-BR" b="1" dirty="0">
+                <a:solidFill>
+                  <a:srgbClr val="00B050"/>
+                </a:solidFill>
+              </a:rPr>
+              <a:t>n		1. ln n</a:t>
             </a:r>
           </a:p>
           <a:p>
@@ -16166,7 +16345,7 @@
             </a:pPr>
             <a:r>
               <a:rPr lang="pt-BR" dirty="0"/>
-              <a:t>3. √n			4. n			</a:t>
+              <a:t>2. √n			3. n			</a:t>
             </a:r>
           </a:p>
           <a:p>
@@ -16175,7 +16354,7 @@
             </a:pPr>
             <a:r>
               <a:rPr lang="pt-BR" dirty="0"/>
-              <a:t>5. n ln n			6. n^2</a:t>
+              <a:t>4. n ln n			5. n^2</a:t>
             </a:r>
           </a:p>
           <a:p>
@@ -16184,7 +16363,7 @@
             </a:pPr>
             <a:r>
               <a:rPr lang="pt-BR" dirty="0"/>
-              <a:t>7. n ^ 4			8. 2^n</a:t>
+              <a:t>6. n ^ 4			7. 2^n</a:t>
             </a:r>
           </a:p>
           <a:p>
@@ -16193,7 +16372,7 @@
             </a:pPr>
             <a:r>
               <a:rPr lang="pt-BR" dirty="0"/>
-              <a:t>9. e^n			10. n!		</a:t>
+              <a:t>8. e^n			9. n!		</a:t>
             </a:r>
             <a:r>
               <a:rPr lang="pt-BR" b="1" dirty="0"/>

</xml_diff>

<commit_message>
Fixed errors in slides
</commit_message>
<xml_diff>
--- a/Tutorial_8/CS1010_TutC09_8.pptx
+++ b/Tutorial_8/CS1010_TutC09_8.pptx
@@ -237,7 +237,7 @@
           <a:p>
             <a:fld id="{9CBF1339-9A09-4147-A280-CE820B321722}" type="datetimeFigureOut">
               <a:rPr lang="en-SG" smtClean="0"/>
-              <a:t>22/10/2018</a:t>
+              <a:t>25/10/2018</a:t>
             </a:fld>
             <a:endParaRPr lang="en-SG"/>
           </a:p>
@@ -4103,7 +4103,7 @@
             <a:fld id="{08B9EBBA-996F-894A-B54A-D6246ED52CEA}" type="datetimeFigureOut">
               <a:rPr lang="en-US" smtClean="0"/>
               <a:pPr/>
-              <a:t>10/22/2018</a:t>
+              <a:t>10/25/2018</a:t>
             </a:fld>
             <a:endParaRPr lang="en-US" dirty="0"/>
           </a:p>
@@ -4435,7 +4435,7 @@
             <a:fld id="{C6C52C72-DE31-F449-A4ED-4C594FD91407}" type="datetimeFigureOut">
               <a:rPr lang="en-US" smtClean="0"/>
               <a:pPr/>
-              <a:t>10/22/2018</a:t>
+              <a:t>10/25/2018</a:t>
             </a:fld>
             <a:endParaRPr lang="en-US" dirty="0"/>
           </a:p>
@@ -4617,7 +4617,7 @@
             <a:fld id="{ED62726E-379B-B349-9EED-81ED093FA806}" type="datetimeFigureOut">
               <a:rPr lang="en-US" smtClean="0"/>
               <a:pPr/>
-              <a:t>10/22/2018</a:t>
+              <a:t>10/25/2018</a:t>
             </a:fld>
             <a:endParaRPr lang="en-US" dirty="0"/>
           </a:p>
@@ -4805,7 +4805,7 @@
             <a:fld id="{9B3A1323-8D79-1946-B0D7-40001CF92E9D}" type="datetimeFigureOut">
               <a:rPr lang="en-US" smtClean="0"/>
               <a:pPr/>
-              <a:t>10/22/2018</a:t>
+              <a:t>10/25/2018</a:t>
             </a:fld>
             <a:endParaRPr lang="en-US" dirty="0"/>
           </a:p>
@@ -5084,7 +5084,7 @@
             <a:fld id="{8DFA1846-DA80-1C48-A609-854EA85C59AD}" type="datetimeFigureOut">
               <a:rPr lang="en-US" smtClean="0"/>
               <a:pPr/>
-              <a:t>10/22/2018</a:t>
+              <a:t>10/25/2018</a:t>
             </a:fld>
             <a:endParaRPr lang="en-US" dirty="0"/>
           </a:p>
@@ -5482,7 +5482,7 @@
             <a:fld id="{57302355-E14B-8545-A8F8-0FE83CC9D524}" type="datetimeFigureOut">
               <a:rPr lang="en-US" smtClean="0"/>
               <a:pPr/>
-              <a:t>10/22/2018</a:t>
+              <a:t>10/25/2018</a:t>
             </a:fld>
             <a:endParaRPr lang="en-US" dirty="0"/>
           </a:p>
@@ -5961,7 +5961,7 @@
             <a:fld id="{02640F58-564D-2B4F-AE67-E407BA4FCF45}" type="datetimeFigureOut">
               <a:rPr lang="en-US" smtClean="0"/>
               <a:pPr/>
-              <a:t>10/22/2018</a:t>
+              <a:t>10/25/2018</a:t>
             </a:fld>
             <a:endParaRPr lang="en-US" dirty="0"/>
           </a:p>
@@ -6081,7 +6081,7 @@
             <a:fld id="{F13A34C8-038E-2045-AF43-DF7DBB8E0E9E}" type="datetimeFigureOut">
               <a:rPr lang="en-US" smtClean="0"/>
               <a:pPr/>
-              <a:t>10/22/2018</a:t>
+              <a:t>10/25/2018</a:t>
             </a:fld>
             <a:endParaRPr lang="en-US" dirty="0"/>
           </a:p>
@@ -6178,7 +6178,7 @@
             <a:fld id="{8818C68F-D26B-8F47-958C-23B49CF8A634}" type="datetimeFigureOut">
               <a:rPr lang="en-US" smtClean="0"/>
               <a:pPr/>
-              <a:t>10/22/2018</a:t>
+              <a:t>10/25/2018</a:t>
             </a:fld>
             <a:endParaRPr lang="en-US" dirty="0"/>
           </a:p>
@@ -6526,7 +6526,7 @@
             <a:fld id="{D0DF5E60-9974-AC48-9591-99C2BB44B7CF}" type="datetimeFigureOut">
               <a:rPr lang="en-US" smtClean="0"/>
               <a:pPr/>
-              <a:t>10/22/2018</a:t>
+              <a:t>10/25/2018</a:t>
             </a:fld>
             <a:endParaRPr lang="en-US" dirty="0"/>
           </a:p>
@@ -6916,7 +6916,7 @@
             <a:fld id="{09B482E8-6E0E-1B4F-B1FD-C69DB9E858D9}" type="datetimeFigureOut">
               <a:rPr lang="en-US" smtClean="0"/>
               <a:pPr/>
-              <a:t>10/22/2018</a:t>
+              <a:t>10/25/2018</a:t>
             </a:fld>
             <a:endParaRPr lang="en-US" dirty="0"/>
           </a:p>
@@ -7198,7 +7198,7 @@
             <a:fld id="{09B482E8-6E0E-1B4F-B1FD-C69DB9E858D9}" type="datetimeFigureOut">
               <a:rPr lang="en-US" smtClean="0"/>
               <a:pPr/>
-              <a:t>10/22/2018</a:t>
+              <a:t>10/25/2018</a:t>
             </a:fld>
             <a:endParaRPr lang="en-US" dirty="0"/>
           </a:p>
@@ -14238,7 +14238,7 @@
             </a:br>
             <a:r>
               <a:rPr lang="en-SG" dirty="0"/>
-              <a:t>C Pre-processor</a:t>
+              <a:t>ASSERT</a:t>
             </a:r>
           </a:p>
         </p:txBody>
@@ -14693,7 +14693,7 @@
                   <a:schemeClr val="tx1"/>
                 </a:solidFill>
               </a:rPr>
-              <a:t>, answer);</a:t>
+              <a:t>, &amp;answer);</a:t>
             </a:r>
             <a:br>
               <a:rPr lang="en-SG" dirty="0">
@@ -14830,7 +14830,7 @@
             </a:br>
             <a:r>
               <a:rPr lang="en-SG" dirty="0"/>
-              <a:t>C Pre-processor</a:t>
+              <a:t>ASSERT</a:t>
             </a:r>
           </a:p>
         </p:txBody>
@@ -16768,7 +16768,19 @@
             </a:r>
             <a:r>
               <a:rPr lang="en-SG" dirty="0"/>
-              <a:t> j = 0; j &lt; n; j += </a:t>
+              <a:t> j = </a:t>
+            </a:r>
+            <a:r>
+              <a:rPr lang="en-SG" dirty="0">
+                <a:solidFill>
+                  <a:srgbClr val="FF0000"/>
+                </a:solidFill>
+              </a:rPr>
+              <a:t>0</a:t>
+            </a:r>
+            <a:r>
+              <a:rPr lang="en-SG" dirty="0"/>
+              <a:t>; j &lt; n; j += </a:t>
             </a:r>
             <a:r>
               <a:rPr lang="en-SG" dirty="0">
@@ -16985,7 +16997,19 @@
             </a:r>
             <a:r>
               <a:rPr lang="en-SG" dirty="0"/>
-              <a:t> j = 0; j &lt; n; j += </a:t>
+              <a:t> j = </a:t>
+            </a:r>
+            <a:r>
+              <a:rPr lang="en-SG" dirty="0">
+                <a:solidFill>
+                  <a:srgbClr val="FF0000"/>
+                </a:solidFill>
+              </a:rPr>
+              <a:t>0</a:t>
+            </a:r>
+            <a:r>
+              <a:rPr lang="en-SG" dirty="0"/>
+              <a:t>; j &lt; n; j += </a:t>
             </a:r>
             <a:r>
               <a:rPr lang="en-SG" dirty="0">
@@ -17159,7 +17183,7 @@
                   <a:srgbClr val="FF0000"/>
                 </a:solidFill>
               </a:rPr>
-              <a:t>0</a:t>
+              <a:t>1</a:t>
             </a:r>
             <a:r>
               <a:rPr lang="en-SG" dirty="0"/>
@@ -17210,7 +17234,19 @@
             </a:r>
             <a:r>
               <a:rPr lang="en-SG" dirty="0"/>
-              <a:t> j = 0; j &lt; n; j *= </a:t>
+              <a:t> j = </a:t>
+            </a:r>
+            <a:r>
+              <a:rPr lang="en-SG" dirty="0">
+                <a:solidFill>
+                  <a:srgbClr val="FF0000"/>
+                </a:solidFill>
+              </a:rPr>
+              <a:t>1</a:t>
+            </a:r>
+            <a:r>
+              <a:rPr lang="en-SG" dirty="0"/>
+              <a:t>; j &lt; n; j *= </a:t>
             </a:r>
             <a:r>
               <a:rPr lang="en-SG" dirty="0">
@@ -17381,7 +17417,7 @@
                   <a:srgbClr val="FF0000"/>
                 </a:solidFill>
               </a:rPr>
-              <a:t>0</a:t>
+              <a:t>1</a:t>
             </a:r>
             <a:r>
               <a:rPr lang="en-SG" dirty="0"/>
@@ -17432,7 +17468,19 @@
             </a:r>
             <a:r>
               <a:rPr lang="en-SG" dirty="0"/>
-              <a:t> j = 0; j &lt; n; j *= </a:t>
+              <a:t> j = </a:t>
+            </a:r>
+            <a:r>
+              <a:rPr lang="en-SG" dirty="0">
+                <a:solidFill>
+                  <a:srgbClr val="FF0000"/>
+                </a:solidFill>
+              </a:rPr>
+              <a:t>1</a:t>
+            </a:r>
+            <a:r>
+              <a:rPr lang="en-SG" dirty="0"/>
+              <a:t>; j &lt; n; j *= </a:t>
             </a:r>
             <a:r>
               <a:rPr lang="en-SG" dirty="0">

</xml_diff>